<commit_message>
Updating Lecture 26 Handout, Slides, and Spreadsheet.  Also, updating the schedule and minor updated to lab 2, 3, & 4.
</commit_message>
<xml_diff>
--- a/lecture/slides/ECE_383_Lec26.pptx
+++ b/lecture/slides/ECE_383_Lec26.pptx
@@ -12,7 +12,7 @@
     <p:handoutMasterId r:id="rId18"/>
   </p:handoutMasterIdLst>
   <p:sldIdLst>
-    <p:sldId id="299" r:id="rId3"/>
+    <p:sldId id="369" r:id="rId3"/>
     <p:sldId id="300" r:id="rId4"/>
     <p:sldId id="356" r:id="rId5"/>
     <p:sldId id="358" r:id="rId6"/>
@@ -866,144 +866,6 @@
 </p:notesMaster>
 </file>
 
-<file path=ppt/notesSlides/notesSlide1.xml><?xml version="1.0" encoding="utf-8"?>
-<p:notes xmlns:a="http://schemas.openxmlformats.org/drawingml/2006/main" xmlns:r="http://schemas.openxmlformats.org/officeDocument/2006/relationships" xmlns:p="http://schemas.openxmlformats.org/presentationml/2006/main">
-  <p:cSld>
-    <p:spTree>
-      <p:nvGrpSpPr>
-        <p:cNvPr id="1" name=""/>
-        <p:cNvGrpSpPr/>
-        <p:nvPr/>
-      </p:nvGrpSpPr>
-      <p:grpSpPr>
-        <a:xfrm>
-          <a:off x="0" y="0"/>
-          <a:ext cx="0" cy="0"/>
-          <a:chOff x="0" y="0"/>
-          <a:chExt cx="0" cy="0"/>
-        </a:xfrm>
-      </p:grpSpPr>
-      <p:sp>
-        <p:nvSpPr>
-          <p:cNvPr id="15362" name="Slide Image Placeholder 1"/>
-          <p:cNvSpPr>
-            <a:spLocks noGrp="1" noRot="1" noChangeAspect="1" noTextEdit="1"/>
-          </p:cNvSpPr>
-          <p:nvPr>
-            <p:ph type="sldImg"/>
-          </p:nvPr>
-        </p:nvSpPr>
-        <p:spPr>
-          <a:ln/>
-        </p:spPr>
-      </p:sp>
-      <p:sp>
-        <p:nvSpPr>
-          <p:cNvPr id="15363" name="Notes Placeholder 2"/>
-          <p:cNvSpPr>
-            <a:spLocks noGrp="1"/>
-          </p:cNvSpPr>
-          <p:nvPr>
-            <p:ph type="body" idx="1"/>
-          </p:nvPr>
-        </p:nvSpPr>
-        <p:spPr>
-          <a:noFill/>
-          <a:ln w="9525"/>
-        </p:spPr>
-        <p:txBody>
-          <a:bodyPr/>
-          <a:lstStyle/>
-          <a:p>
-            <a:r>
-              <a:rPr lang="en-US" dirty="0" smtClean="0"/>
-              <a:t>Write on board:</a:t>
-            </a:r>
-          </a:p>
-          <a:p>
-            <a:endParaRPr lang="en-US" dirty="0" smtClean="0"/>
-          </a:p>
-          <a:p>
-            <a:r>
-              <a:rPr lang="en-US" u="sng" dirty="0" smtClean="0"/>
-              <a:t>ECE</a:t>
-            </a:r>
-            <a:r>
-              <a:rPr lang="en-US" u="sng" baseline="0" dirty="0" smtClean="0"/>
-              <a:t> 315</a:t>
-            </a:r>
-          </a:p>
-          <a:p>
-            <a:r>
-              <a:rPr lang="en-US" baseline="0" dirty="0" smtClean="0"/>
-              <a:t>Day 1 – Admin</a:t>
-            </a:r>
-          </a:p>
-          <a:p>
-            <a:r>
-              <a:rPr lang="en-US" baseline="0" dirty="0" smtClean="0"/>
-              <a:t>Section Marcher</a:t>
-            </a:r>
-          </a:p>
-          <a:p>
-            <a:r>
-              <a:rPr lang="en-US" baseline="0" dirty="0" smtClean="0"/>
-              <a:t>Introductions</a:t>
-            </a:r>
-          </a:p>
-          <a:p>
-            <a:r>
-              <a:rPr lang="en-US" baseline="0" dirty="0" smtClean="0"/>
-              <a:t>Syllabus</a:t>
-            </a:r>
-          </a:p>
-          <a:p>
-            <a:endParaRPr lang="en-US" dirty="0" smtClean="0"/>
-          </a:p>
-        </p:txBody>
-      </p:sp>
-      <p:sp>
-        <p:nvSpPr>
-          <p:cNvPr id="15364" name="Slide Number Placeholder 3"/>
-          <p:cNvSpPr>
-            <a:spLocks noGrp="1"/>
-          </p:cNvSpPr>
-          <p:nvPr>
-            <p:ph type="sldNum" sz="quarter" idx="5"/>
-          </p:nvPr>
-        </p:nvSpPr>
-        <p:spPr>
-          <a:noFill/>
-        </p:spPr>
-        <p:txBody>
-          <a:bodyPr/>
-          <a:lstStyle/>
-          <a:p>
-            <a:fld id="{B581BCBC-E066-4910-B192-91C4189936ED}" type="slidenum">
-              <a:rPr lang="en-US">
-                <a:solidFill>
-                  <a:prstClr val="black"/>
-                </a:solidFill>
-              </a:rPr>
-              <a:pPr/>
-              <a:t>1</a:t>
-            </a:fld>
-            <a:endParaRPr lang="en-US">
-              <a:solidFill>
-                <a:prstClr val="black"/>
-              </a:solidFill>
-            </a:endParaRPr>
-          </a:p>
-        </p:txBody>
-      </p:sp>
-    </p:spTree>
-  </p:cSld>
-  <p:clrMapOvr>
-    <a:masterClrMapping/>
-  </p:clrMapOvr>
-</p:notes>
-</file>
-
 <file path=ppt/slideLayouts/slideLayout1.xml><?xml version="1.0" encoding="utf-8"?>
 <p:sldLayout xmlns:a="http://schemas.openxmlformats.org/drawingml/2006/main" xmlns:r="http://schemas.openxmlformats.org/officeDocument/2006/relationships" xmlns:p="http://schemas.openxmlformats.org/presentationml/2006/main" type="title" preserve="1">
   <p:cSld name="Title Slide">
@@ -1192,7 +1054,7 @@
                 </a:solidFill>
               </a:rPr>
               <a:pPr/>
-              <a:t>4/5/2016</a:t>
+              <a:t>3/19/2017</a:t>
             </a:fld>
             <a:endParaRPr lang="en-US">
               <a:solidFill>
@@ -1394,7 +1256,7 @@
                 </a:solidFill>
               </a:rPr>
               <a:pPr/>
-              <a:t>4/5/2016</a:t>
+              <a:t>3/19/2017</a:t>
             </a:fld>
             <a:endParaRPr lang="en-US">
               <a:solidFill>
@@ -1606,7 +1468,7 @@
                 </a:solidFill>
               </a:rPr>
               <a:pPr/>
-              <a:t>4/5/2016</a:t>
+              <a:t>3/19/2017</a:t>
             </a:fld>
             <a:endParaRPr lang="en-US">
               <a:solidFill>
@@ -2097,7 +1959,7 @@
                 </a:spcAft>
                 <a:defRPr/>
               </a:pPr>
-              <a:t>5 April 2016</a:t>
+              <a:t>19 March 2017</a:t>
             </a:fld>
             <a:endParaRPr lang="en-US" sz="1800">
               <a:solidFill>
@@ -2362,7 +2224,7 @@
                 </a:spcAft>
                 <a:defRPr/>
               </a:pPr>
-              <a:t>5 April 2016</a:t>
+              <a:t>19 March 2017</a:t>
             </a:fld>
             <a:endParaRPr lang="en-US" sz="1800">
               <a:solidFill>
@@ -2716,7 +2578,7 @@
                 </a:spcAft>
                 <a:defRPr/>
               </a:pPr>
-              <a:t>5 April 2016</a:t>
+              <a:t>19 March 2017</a:t>
             </a:fld>
             <a:endParaRPr lang="en-US" sz="1800">
               <a:solidFill>
@@ -3209,7 +3071,7 @@
                 </a:spcAft>
                 <a:defRPr/>
               </a:pPr>
-              <a:t>5 April 2016</a:t>
+              <a:t>19 March 2017</a:t>
             </a:fld>
             <a:endParaRPr lang="en-US" sz="1800">
               <a:solidFill>
@@ -3393,7 +3255,7 @@
                 </a:spcAft>
                 <a:defRPr/>
               </a:pPr>
-              <a:t>5 April 2016</a:t>
+              <a:t>19 March 2017</a:t>
             </a:fld>
             <a:endParaRPr lang="en-US" sz="1800">
               <a:solidFill>
@@ -3554,7 +3416,7 @@
                 </a:spcAft>
                 <a:defRPr/>
               </a:pPr>
-              <a:t>5 April 2016</a:t>
+              <a:t>19 March 2017</a:t>
             </a:fld>
             <a:endParaRPr lang="en-US" sz="1800">
               <a:solidFill>
@@ -3897,7 +3759,7 @@
                 </a:spcAft>
                 <a:defRPr/>
               </a:pPr>
-              <a:t>5 April 2016</a:t>
+              <a:t>19 March 2017</a:t>
             </a:fld>
             <a:endParaRPr lang="en-US" sz="1800">
               <a:solidFill>
@@ -4036,7 +3898,7 @@
                 </a:solidFill>
               </a:rPr>
               <a:pPr/>
-              <a:t>4/5/2016</a:t>
+              <a:t>3/19/2017</a:t>
             </a:fld>
             <a:endParaRPr lang="en-US">
               <a:solidFill>
@@ -4419,7 +4281,7 @@
                 </a:spcAft>
                 <a:defRPr/>
               </a:pPr>
-              <a:t>5 April 2016</a:t>
+              <a:t>19 March 2017</a:t>
             </a:fld>
             <a:endParaRPr lang="en-US" sz="1800">
               <a:solidFill>
@@ -4655,7 +4517,7 @@
                 </a:spcAft>
                 <a:defRPr/>
               </a:pPr>
-              <a:t>5 April 2016</a:t>
+              <a:t>19 March 2017</a:t>
             </a:fld>
             <a:endParaRPr lang="en-US" sz="1800">
               <a:solidFill>
@@ -4901,7 +4763,7 @@
                 </a:spcAft>
                 <a:defRPr/>
               </a:pPr>
-              <a:t>5 April 2016</a:t>
+              <a:t>19 March 2017</a:t>
             </a:fld>
             <a:endParaRPr lang="en-US" sz="1800">
               <a:solidFill>
@@ -5115,7 +4977,7 @@
                 </a:spcAft>
                 <a:defRPr/>
               </a:pPr>
-              <a:t>5 April 2016</a:t>
+              <a:t>19 March 2017</a:t>
             </a:fld>
             <a:endParaRPr lang="en-US" sz="1800">
               <a:solidFill>
@@ -5330,7 +5192,7 @@
                 </a:solidFill>
               </a:rPr>
               <a:pPr/>
-              <a:t>4/5/2016</a:t>
+              <a:t>3/19/2017</a:t>
             </a:fld>
             <a:endParaRPr lang="en-US">
               <a:solidFill>
@@ -5650,7 +5512,7 @@
                 </a:solidFill>
               </a:rPr>
               <a:pPr/>
-              <a:t>4/5/2016</a:t>
+              <a:t>3/19/2017</a:t>
             </a:fld>
             <a:endParaRPr lang="en-US">
               <a:solidFill>
@@ -6104,7 +5966,7 @@
                 </a:solidFill>
               </a:rPr>
               <a:pPr/>
-              <a:t>4/5/2016</a:t>
+              <a:t>3/19/2017</a:t>
             </a:fld>
             <a:endParaRPr lang="en-US">
               <a:solidFill>
@@ -6254,7 +6116,7 @@
                 </a:solidFill>
               </a:rPr>
               <a:pPr/>
-              <a:t>4/5/2016</a:t>
+              <a:t>3/19/2017</a:t>
             </a:fld>
             <a:endParaRPr lang="en-US">
               <a:solidFill>
@@ -6381,7 +6243,7 @@
                 </a:solidFill>
               </a:rPr>
               <a:pPr/>
-              <a:t>4/5/2016</a:t>
+              <a:t>3/19/2017</a:t>
             </a:fld>
             <a:endParaRPr lang="en-US">
               <a:solidFill>
@@ -6690,7 +6552,7 @@
                 </a:solidFill>
               </a:rPr>
               <a:pPr/>
-              <a:t>4/5/2016</a:t>
+              <a:t>3/19/2017</a:t>
             </a:fld>
             <a:endParaRPr lang="en-US">
               <a:solidFill>
@@ -6975,7 +6837,7 @@
                 </a:solidFill>
               </a:rPr>
               <a:pPr/>
-              <a:t>4/5/2016</a:t>
+              <a:t>3/19/2017</a:t>
             </a:fld>
             <a:endParaRPr lang="en-US">
               <a:solidFill>
@@ -7236,7 +7098,7 @@
                   <a:spcPts val="0"/>
                 </a:spcAft>
               </a:pPr>
-              <a:t>4/5/2016</a:t>
+              <a:t>3/19/2017</a:t>
             </a:fld>
             <a:endParaRPr lang="en-US">
               <a:solidFill>
@@ -7867,38 +7729,6 @@
           </a:p>
         </p:txBody>
       </p:sp>
-      <p:pic>
-        <p:nvPicPr>
-          <p:cNvPr id="1030" name="Picture 41" descr="usafaseal2"/>
-          <p:cNvPicPr>
-            <a:picLocks noChangeAspect="1" noChangeArrowheads="1"/>
-          </p:cNvPicPr>
-          <p:nvPr userDrawn="1"/>
-        </p:nvPicPr>
-        <p:blipFill>
-          <a:blip r:embed="rId14" cstate="print"/>
-          <a:srcRect/>
-          <a:stretch>
-            <a:fillRect/>
-          </a:stretch>
-        </p:blipFill>
-        <p:spPr bwMode="auto">
-          <a:xfrm>
-            <a:off x="385763" y="0"/>
-            <a:ext cx="1287462" cy="1352550"/>
-          </a:xfrm>
-          <a:prstGeom prst="rect">
-            <a:avLst/>
-          </a:prstGeom>
-          <a:noFill/>
-          <a:ln w="9525">
-            <a:noFill/>
-            <a:miter lim="800000"/>
-            <a:headEnd/>
-            <a:tailEnd/>
-          </a:ln>
-        </p:spPr>
-      </p:pic>
       <p:sp>
         <p:nvSpPr>
           <p:cNvPr id="1067" name="Text Box 43"/>
@@ -8057,6 +7887,47 @@
           </a:p>
         </p:txBody>
       </p:sp>
+      <p:pic>
+        <p:nvPicPr>
+          <p:cNvPr id="9" name="Picture 2" descr="C:\Users\Ashley.Murphy\Desktop\USAFA%20Logo%20v%203%20line%20CMYK.png"/>
+          <p:cNvPicPr>
+            <a:picLocks noChangeAspect="1" noChangeArrowheads="1"/>
+          </p:cNvPicPr>
+          <p:nvPr userDrawn="1"/>
+        </p:nvPicPr>
+        <p:blipFill>
+          <a:blip r:embed="rId14" cstate="print">
+            <a:extLst>
+              <a:ext uri="{28A0092B-C50C-407E-A947-70E740481C1C}">
+                <a14:useLocalDpi xmlns:a14="http://schemas.microsoft.com/office/drawing/2010/main" val="0"/>
+              </a:ext>
+            </a:extLst>
+          </a:blip>
+          <a:srcRect/>
+          <a:stretch>
+            <a:fillRect/>
+          </a:stretch>
+        </p:blipFill>
+        <p:spPr bwMode="auto">
+          <a:xfrm>
+            <a:off x="462601" y="76202"/>
+            <a:ext cx="1065031" cy="1213885"/>
+          </a:xfrm>
+          <a:prstGeom prst="rect">
+            <a:avLst/>
+          </a:prstGeom>
+          <a:noFill/>
+          <a:extLst>
+            <a:ext uri="{909E8E84-426E-40DD-AFC4-6F175D3DCCD1}">
+              <a14:hiddenFill xmlns:a14="http://schemas.microsoft.com/office/drawing/2010/main">
+                <a:solidFill>
+                  <a:srgbClr val="FFFFFF"/>
+                </a:solidFill>
+              </a14:hiddenFill>
+            </a:ext>
+          </a:extLst>
+        </p:spPr>
+      </p:pic>
     </p:spTree>
     <p:extLst>
       <p:ext uri="{BB962C8B-B14F-4D97-AF65-F5344CB8AC3E}">
@@ -8513,102 +8384,62 @@
       </p:grpSpPr>
       <p:sp>
         <p:nvSpPr>
-          <p:cNvPr id="4098" name="Rectangle 2"/>
+          <p:cNvPr id="4" name="Line 14"/>
           <p:cNvSpPr>
-            <a:spLocks noGrp="1" noChangeArrowheads="1"/>
-          </p:cNvSpPr>
-          <p:nvPr>
-            <p:ph type="ctrTitle"/>
-          </p:nvPr>
-        </p:nvSpPr>
-        <p:spPr>
+            <a:spLocks noChangeShapeType="1"/>
+          </p:cNvSpPr>
+          <p:nvPr/>
+        </p:nvSpPr>
+        <p:spPr bwMode="auto">
           <a:xfrm>
-            <a:off x="0" y="1523999"/>
-            <a:ext cx="9144000" cy="2104571"/>
+            <a:off x="381000" y="6451600"/>
+            <a:ext cx="8382000" cy="0"/>
           </a:xfrm>
+          <a:prstGeom prst="line">
+            <a:avLst/>
+          </a:prstGeom>
+          <a:noFill/>
+          <a:ln w="57150">
+            <a:solidFill>
+              <a:srgbClr val="0C2D83"/>
+            </a:solidFill>
+            <a:round/>
+            <a:headEnd/>
+            <a:tailEnd/>
+          </a:ln>
+          <a:effectLst/>
         </p:spPr>
         <p:txBody>
-          <a:bodyPr>
-            <a:normAutofit/>
-          </a:bodyPr>
+          <a:bodyPr wrap="none" lIns="91440" tIns="45720" rIns="91440" bIns="45720" anchor="ctr"/>
           <a:lstStyle/>
           <a:p>
-            <a:r>
-              <a:rPr lang="en-US" sz="4000" dirty="0" smtClean="0"/>
-              <a:t>ECE 383 – Embedded Computer Systems II</a:t>
-            </a:r>
-            <a:br>
-              <a:rPr lang="en-US" sz="4000" dirty="0" smtClean="0"/>
-            </a:br>
-            <a:r>
-              <a:rPr lang="en-US" sz="4000" dirty="0" smtClean="0"/>
-              <a:t>Lecture 26 – Digital Low Pass Filter</a:t>
-            </a:r>
+            <a:pPr algn="ctr" eaLnBrk="0" hangingPunct="0">
+              <a:spcBef>
+                <a:spcPct val="0"/>
+              </a:spcBef>
+              <a:defRPr/>
+            </a:pPr>
+            <a:endParaRPr lang="en-US" sz="1400" dirty="0">
+              <a:solidFill>
+                <a:srgbClr val="000000"/>
+              </a:solidFill>
+              <a:latin typeface="Arial" charset="0"/>
+            </a:endParaRPr>
           </a:p>
         </p:txBody>
       </p:sp>
       <p:sp>
         <p:nvSpPr>
-          <p:cNvPr id="4099" name="Rectangle 3"/>
-          <p:cNvSpPr>
-            <a:spLocks noGrp="1" noChangeArrowheads="1"/>
-          </p:cNvSpPr>
-          <p:nvPr>
-            <p:ph type="subTitle" idx="1"/>
-          </p:nvPr>
-        </p:nvSpPr>
-        <p:spPr>
-          <a:xfrm>
-            <a:off x="3333750" y="3754438"/>
-            <a:ext cx="5048250" cy="2187575"/>
-          </a:xfrm>
-        </p:spPr>
-        <p:txBody>
-          <a:bodyPr>
-            <a:normAutofit/>
-          </a:bodyPr>
-          <a:lstStyle/>
-          <a:p>
-            <a:r>
-              <a:rPr lang="en-US" dirty="0" smtClean="0"/>
-              <a:t>Capt Jeffrey Falkinburg</a:t>
-            </a:r>
-            <a:br>
-              <a:rPr lang="en-US" dirty="0" smtClean="0"/>
-            </a:br>
-            <a:r>
-              <a:rPr lang="en-US" dirty="0" smtClean="0"/>
-              <a:t>Room 2E46C</a:t>
-            </a:r>
-            <a:br>
-              <a:rPr lang="en-US" dirty="0" smtClean="0"/>
-            </a:br>
-            <a:r>
-              <a:rPr lang="en-US" dirty="0" smtClean="0"/>
-              <a:t>333-7366</a:t>
-            </a:r>
-          </a:p>
-        </p:txBody>
-      </p:sp>
-      <p:pic>
-        <p:nvPicPr>
-          <p:cNvPr id="4101" name="Picture 31" descr="usafaseal2"/>
-          <p:cNvPicPr>
-            <a:picLocks noChangeAspect="1" noChangeArrowheads="1"/>
-          </p:cNvPicPr>
+          <p:cNvPr id="8" name="Rectangle 13"/>
+          <p:cNvSpPr txBox="1">
+            <a:spLocks noChangeArrowheads="1"/>
+          </p:cNvSpPr>
           <p:nvPr/>
-        </p:nvPicPr>
-        <p:blipFill>
-          <a:blip r:embed="rId3" cstate="print"/>
-          <a:srcRect/>
-          <a:stretch>
-            <a:fillRect/>
-          </a:stretch>
-        </p:blipFill>
+        </p:nvSpPr>
         <p:spPr bwMode="auto">
           <a:xfrm>
-            <a:off x="520700" y="2903538"/>
-            <a:ext cx="3035300" cy="3187700"/>
+            <a:off x="3070748" y="1774211"/>
+            <a:ext cx="5581888" cy="2854051"/>
           </a:xfrm>
           <a:prstGeom prst="rect">
             <a:avLst/>
@@ -8621,134 +8452,551 @@
             <a:tailEnd/>
           </a:ln>
         </p:spPr>
-      </p:pic>
-      <p:sp>
-        <p:nvSpPr>
-          <p:cNvPr id="4102" name="Text Box 6"/>
+        <p:txBody>
+          <a:bodyPr vert="horz" wrap="square" lIns="91440" tIns="45720" rIns="91440" bIns="45720" numCol="1" anchor="ctr" anchorCtr="0" compatLnSpc="1">
+            <a:prstTxWarp prst="textNoShape">
+              <a:avLst/>
+            </a:prstTxWarp>
+          </a:bodyPr>
+          <a:lstStyle>
+            <a:lvl1pPr algn="r" rtl="0" eaLnBrk="0" fontAlgn="base" hangingPunct="0">
+              <a:spcBef>
+                <a:spcPct val="0"/>
+              </a:spcBef>
+              <a:spcAft>
+                <a:spcPct val="0"/>
+              </a:spcAft>
+              <a:defRPr sz="4400" b="1">
+                <a:solidFill>
+                  <a:srgbClr val="0C2D83"/>
+                </a:solidFill>
+                <a:effectLst>
+                  <a:outerShdw blurRad="38100" dist="38100" dir="2700000" algn="tl">
+                    <a:srgbClr val="000000">
+                      <a:alpha val="43137"/>
+                    </a:srgbClr>
+                  </a:outerShdw>
+                </a:effectLst>
+                <a:latin typeface="+mj-lt"/>
+                <a:ea typeface="+mj-ea"/>
+                <a:cs typeface="+mj-cs"/>
+              </a:defRPr>
+            </a:lvl1pPr>
+            <a:lvl2pPr algn="r" rtl="0" eaLnBrk="0" fontAlgn="base" hangingPunct="0">
+              <a:spcBef>
+                <a:spcPct val="0"/>
+              </a:spcBef>
+              <a:spcAft>
+                <a:spcPct val="0"/>
+              </a:spcAft>
+              <a:defRPr sz="3600" b="1">
+                <a:solidFill>
+                  <a:srgbClr val="0C2D83"/>
+                </a:solidFill>
+                <a:latin typeface="Arial" charset="0"/>
+              </a:defRPr>
+            </a:lvl2pPr>
+            <a:lvl3pPr algn="r" rtl="0" eaLnBrk="0" fontAlgn="base" hangingPunct="0">
+              <a:spcBef>
+                <a:spcPct val="0"/>
+              </a:spcBef>
+              <a:spcAft>
+                <a:spcPct val="0"/>
+              </a:spcAft>
+              <a:defRPr sz="3600" b="1">
+                <a:solidFill>
+                  <a:srgbClr val="0C2D83"/>
+                </a:solidFill>
+                <a:latin typeface="Arial" charset="0"/>
+              </a:defRPr>
+            </a:lvl3pPr>
+            <a:lvl4pPr algn="r" rtl="0" eaLnBrk="0" fontAlgn="base" hangingPunct="0">
+              <a:spcBef>
+                <a:spcPct val="0"/>
+              </a:spcBef>
+              <a:spcAft>
+                <a:spcPct val="0"/>
+              </a:spcAft>
+              <a:defRPr sz="3600" b="1">
+                <a:solidFill>
+                  <a:srgbClr val="0C2D83"/>
+                </a:solidFill>
+                <a:latin typeface="Arial" charset="0"/>
+              </a:defRPr>
+            </a:lvl4pPr>
+            <a:lvl5pPr algn="r" rtl="0" eaLnBrk="0" fontAlgn="base" hangingPunct="0">
+              <a:spcBef>
+                <a:spcPct val="0"/>
+              </a:spcBef>
+              <a:spcAft>
+                <a:spcPct val="0"/>
+              </a:spcAft>
+              <a:defRPr sz="3600" b="1">
+                <a:solidFill>
+                  <a:srgbClr val="0C2D83"/>
+                </a:solidFill>
+                <a:latin typeface="Arial" charset="0"/>
+              </a:defRPr>
+            </a:lvl5pPr>
+            <a:lvl6pPr marL="457200" algn="r" rtl="0" fontAlgn="base">
+              <a:spcBef>
+                <a:spcPct val="0"/>
+              </a:spcBef>
+              <a:spcAft>
+                <a:spcPct val="0"/>
+              </a:spcAft>
+              <a:defRPr sz="3600" b="1">
+                <a:solidFill>
+                  <a:srgbClr val="0C2D83"/>
+                </a:solidFill>
+                <a:latin typeface="Arial" charset="0"/>
+              </a:defRPr>
+            </a:lvl6pPr>
+            <a:lvl7pPr marL="914400" algn="r" rtl="0" fontAlgn="base">
+              <a:spcBef>
+                <a:spcPct val="0"/>
+              </a:spcBef>
+              <a:spcAft>
+                <a:spcPct val="0"/>
+              </a:spcAft>
+              <a:defRPr sz="3600" b="1">
+                <a:solidFill>
+                  <a:srgbClr val="0C2D83"/>
+                </a:solidFill>
+                <a:latin typeface="Arial" charset="0"/>
+              </a:defRPr>
+            </a:lvl7pPr>
+            <a:lvl8pPr marL="1371600" algn="r" rtl="0" fontAlgn="base">
+              <a:spcBef>
+                <a:spcPct val="0"/>
+              </a:spcBef>
+              <a:spcAft>
+                <a:spcPct val="0"/>
+              </a:spcAft>
+              <a:defRPr sz="3600" b="1">
+                <a:solidFill>
+                  <a:srgbClr val="0C2D83"/>
+                </a:solidFill>
+                <a:latin typeface="Arial" charset="0"/>
+              </a:defRPr>
+            </a:lvl8pPr>
+            <a:lvl9pPr marL="1828800" algn="r" rtl="0" fontAlgn="base">
+              <a:spcBef>
+                <a:spcPct val="0"/>
+              </a:spcBef>
+              <a:spcAft>
+                <a:spcPct val="0"/>
+              </a:spcAft>
+              <a:defRPr sz="3600" b="1">
+                <a:solidFill>
+                  <a:srgbClr val="0C2D83"/>
+                </a:solidFill>
+                <a:latin typeface="Arial" charset="0"/>
+              </a:defRPr>
+            </a:lvl9pPr>
+          </a:lstStyle>
+          <a:p>
+            <a:pPr algn="ctr"/>
+            <a:r>
+              <a:rPr lang="en-US" sz="4000" kern="0" dirty="0">
+                <a:effectLst/>
+                <a:latin typeface="Trebuchet MS" panose="020B0603020202020204" pitchFamily="34" charset="0"/>
+              </a:rPr>
+              <a:t>ECE 383 – Embedded Computer Systems II</a:t>
+            </a:r>
+            <a:br>
+              <a:rPr lang="en-US" sz="4000" kern="0" dirty="0">
+                <a:effectLst/>
+                <a:latin typeface="Trebuchet MS" panose="020B0603020202020204" pitchFamily="34" charset="0"/>
+              </a:rPr>
+            </a:br>
+            <a:r>
+              <a:rPr lang="en-US" sz="3600" kern="0" dirty="0">
+                <a:effectLst/>
+                <a:latin typeface="Trebuchet MS" panose="020B0603020202020204" pitchFamily="34" charset="0"/>
+              </a:rPr>
+              <a:t>Lecture 26 – Digital Low Pass Filter</a:t>
+            </a:r>
+          </a:p>
+        </p:txBody>
+      </p:sp>
+      <p:sp>
+        <p:nvSpPr>
+          <p:cNvPr id="6" name="Slide Number Placeholder 21"/>
           <p:cNvSpPr txBox="1">
-            <a:spLocks noChangeArrowheads="1"/>
+            <a:spLocks/>
           </p:cNvSpPr>
           <p:nvPr/>
         </p:nvSpPr>
-        <p:spPr bwMode="auto">
+        <p:spPr>
           <a:xfrm>
-            <a:off x="1610251" y="500063"/>
-            <a:ext cx="5872698" cy="707886"/>
+            <a:off x="8551335" y="6521450"/>
+            <a:ext cx="592667" cy="336550"/>
           </a:xfrm>
           <a:prstGeom prst="rect">
             <a:avLst/>
           </a:prstGeom>
+        </p:spPr>
+        <p:txBody>
+          <a:bodyPr lIns="91440" tIns="45720" rIns="91440" bIns="45720"/>
+          <a:lstStyle>
+            <a:defPPr>
+              <a:defRPr lang="en-US"/>
+            </a:defPPr>
+            <a:lvl1pPr algn="l" rtl="0" fontAlgn="base">
+              <a:spcBef>
+                <a:spcPct val="0"/>
+              </a:spcBef>
+              <a:spcAft>
+                <a:spcPct val="0"/>
+              </a:spcAft>
+              <a:defRPr sz="1400" kern="1200">
+                <a:solidFill>
+                  <a:schemeClr val="tx1"/>
+                </a:solidFill>
+                <a:latin typeface="Arial" charset="0"/>
+                <a:ea typeface="+mn-ea"/>
+                <a:cs typeface="+mn-cs"/>
+              </a:defRPr>
+            </a:lvl1pPr>
+            <a:lvl2pPr marL="457200" algn="l" rtl="0" fontAlgn="base">
+              <a:spcBef>
+                <a:spcPct val="0"/>
+              </a:spcBef>
+              <a:spcAft>
+                <a:spcPct val="0"/>
+              </a:spcAft>
+              <a:defRPr sz="1400" kern="1200">
+                <a:solidFill>
+                  <a:schemeClr val="tx1"/>
+                </a:solidFill>
+                <a:latin typeface="Arial" charset="0"/>
+                <a:ea typeface="+mn-ea"/>
+                <a:cs typeface="+mn-cs"/>
+              </a:defRPr>
+            </a:lvl2pPr>
+            <a:lvl3pPr marL="914400" algn="l" rtl="0" fontAlgn="base">
+              <a:spcBef>
+                <a:spcPct val="0"/>
+              </a:spcBef>
+              <a:spcAft>
+                <a:spcPct val="0"/>
+              </a:spcAft>
+              <a:defRPr sz="1400" kern="1200">
+                <a:solidFill>
+                  <a:schemeClr val="tx1"/>
+                </a:solidFill>
+                <a:latin typeface="Arial" charset="0"/>
+                <a:ea typeface="+mn-ea"/>
+                <a:cs typeface="+mn-cs"/>
+              </a:defRPr>
+            </a:lvl3pPr>
+            <a:lvl4pPr marL="1371600" algn="l" rtl="0" fontAlgn="base">
+              <a:spcBef>
+                <a:spcPct val="0"/>
+              </a:spcBef>
+              <a:spcAft>
+                <a:spcPct val="0"/>
+              </a:spcAft>
+              <a:defRPr sz="1400" kern="1200">
+                <a:solidFill>
+                  <a:schemeClr val="tx1"/>
+                </a:solidFill>
+                <a:latin typeface="Arial" charset="0"/>
+                <a:ea typeface="+mn-ea"/>
+                <a:cs typeface="+mn-cs"/>
+              </a:defRPr>
+            </a:lvl4pPr>
+            <a:lvl5pPr marL="1828800" algn="l" rtl="0" fontAlgn="base">
+              <a:spcBef>
+                <a:spcPct val="0"/>
+              </a:spcBef>
+              <a:spcAft>
+                <a:spcPct val="0"/>
+              </a:spcAft>
+              <a:defRPr sz="1400" kern="1200">
+                <a:solidFill>
+                  <a:schemeClr val="tx1"/>
+                </a:solidFill>
+                <a:latin typeface="Arial" charset="0"/>
+                <a:ea typeface="+mn-ea"/>
+                <a:cs typeface="+mn-cs"/>
+              </a:defRPr>
+            </a:lvl5pPr>
+            <a:lvl6pPr marL="2286000" algn="l" defTabSz="914400" rtl="0" eaLnBrk="1" latinLnBrk="0" hangingPunct="1">
+              <a:defRPr sz="1400" kern="1200">
+                <a:solidFill>
+                  <a:schemeClr val="tx1"/>
+                </a:solidFill>
+                <a:latin typeface="Arial" charset="0"/>
+                <a:ea typeface="+mn-ea"/>
+                <a:cs typeface="+mn-cs"/>
+              </a:defRPr>
+            </a:lvl6pPr>
+            <a:lvl7pPr marL="2743200" algn="l" defTabSz="914400" rtl="0" eaLnBrk="1" latinLnBrk="0" hangingPunct="1">
+              <a:defRPr sz="1400" kern="1200">
+                <a:solidFill>
+                  <a:schemeClr val="tx1"/>
+                </a:solidFill>
+                <a:latin typeface="Arial" charset="0"/>
+                <a:ea typeface="+mn-ea"/>
+                <a:cs typeface="+mn-cs"/>
+              </a:defRPr>
+            </a:lvl7pPr>
+            <a:lvl8pPr marL="3200400" algn="l" defTabSz="914400" rtl="0" eaLnBrk="1" latinLnBrk="0" hangingPunct="1">
+              <a:defRPr sz="1400" kern="1200">
+                <a:solidFill>
+                  <a:schemeClr val="tx1"/>
+                </a:solidFill>
+                <a:latin typeface="Arial" charset="0"/>
+                <a:ea typeface="+mn-ea"/>
+                <a:cs typeface="+mn-cs"/>
+              </a:defRPr>
+            </a:lvl8pPr>
+            <a:lvl9pPr marL="3657600" algn="l" defTabSz="914400" rtl="0" eaLnBrk="1" latinLnBrk="0" hangingPunct="1">
+              <a:defRPr sz="1400" kern="1200">
+                <a:solidFill>
+                  <a:schemeClr val="tx1"/>
+                </a:solidFill>
+                <a:latin typeface="Arial" charset="0"/>
+                <a:ea typeface="+mn-ea"/>
+                <a:cs typeface="+mn-cs"/>
+              </a:defRPr>
+            </a:lvl9pPr>
+          </a:lstStyle>
+          <a:p>
+            <a:pPr algn="ctr">
+              <a:defRPr/>
+            </a:pPr>
+            <a:fld id="{D7580031-58D8-4E1D-BF97-18519902E6F9}" type="slidenum">
+              <a:rPr lang="en-US" smtClean="0">
+                <a:solidFill>
+                  <a:srgbClr val="000000"/>
+                </a:solidFill>
+                <a:latin typeface="Trebuchet MS" panose="020B0603020202020204" pitchFamily="34" charset="0"/>
+              </a:rPr>
+              <a:pPr algn="ctr">
+                <a:defRPr/>
+              </a:pPr>
+              <a:t>1</a:t>
+            </a:fld>
+            <a:endParaRPr lang="en-US" dirty="0">
+              <a:solidFill>
+                <a:srgbClr val="000000"/>
+              </a:solidFill>
+              <a:latin typeface="Trebuchet MS" panose="020B0603020202020204" pitchFamily="34" charset="0"/>
+            </a:endParaRPr>
+          </a:p>
+        </p:txBody>
+      </p:sp>
+      <p:sp>
+        <p:nvSpPr>
+          <p:cNvPr id="5" name="Line 14"/>
+          <p:cNvSpPr>
+            <a:spLocks noChangeShapeType="1"/>
+          </p:cNvSpPr>
+          <p:nvPr/>
+        </p:nvSpPr>
+        <p:spPr bwMode="auto">
+          <a:xfrm>
+            <a:off x="382200" y="6316000"/>
+            <a:ext cx="8382000" cy="0"/>
+          </a:xfrm>
+          <a:prstGeom prst="line">
+            <a:avLst/>
+          </a:prstGeom>
           <a:noFill/>
-          <a:ln w="9525">
-            <a:noFill/>
-            <a:miter lim="800000"/>
+          <a:ln w="57150">
+            <a:solidFill>
+              <a:schemeClr val="bg1">
+                <a:lumMod val="65000"/>
+              </a:schemeClr>
+            </a:solidFill>
+            <a:round/>
             <a:headEnd/>
             <a:tailEnd/>
           </a:ln>
           <a:effectLst/>
         </p:spPr>
         <p:txBody>
-          <a:bodyPr wrap="none">
-            <a:spAutoFit/>
-          </a:bodyPr>
+          <a:bodyPr wrap="none" lIns="91440" tIns="45720" rIns="91440" bIns="45720" anchor="ctr"/>
           <a:lstStyle/>
           <a:p>
-            <a:pPr algn="ctr" fontAlgn="auto">
+            <a:pPr algn="ctr" eaLnBrk="0" hangingPunct="0">
               <a:spcBef>
-                <a:spcPts val="0"/>
+                <a:spcPct val="0"/>
               </a:spcBef>
-              <a:spcAft>
-                <a:spcPts val="0"/>
-              </a:spcAft>
+              <a:defRPr/>
             </a:pPr>
-            <a:r>
-              <a:rPr lang="en-US" sz="4000" b="1" i="1" dirty="0">
-                <a:solidFill>
-                  <a:prstClr val="black"/>
-                </a:solidFill>
-                <a:latin typeface="Calibri"/>
-              </a:rPr>
-              <a:t>HQ U.S. Air Force Academy</a:t>
-            </a:r>
+            <a:endParaRPr lang="en-US" sz="1400" dirty="0">
+              <a:solidFill>
+                <a:srgbClr val="000000"/>
+              </a:solidFill>
+              <a:latin typeface="Arial" charset="0"/>
+            </a:endParaRPr>
           </a:p>
         </p:txBody>
       </p:sp>
       <p:sp>
         <p:nvSpPr>
-          <p:cNvPr id="4103" name="Text Box 7"/>
-          <p:cNvSpPr txBox="1">
-            <a:spLocks noChangeArrowheads="1"/>
+          <p:cNvPr id="7" name="Line 14"/>
+          <p:cNvSpPr>
+            <a:spLocks noChangeShapeType="1"/>
           </p:cNvSpPr>
           <p:nvPr/>
         </p:nvSpPr>
         <p:spPr bwMode="auto">
           <a:xfrm>
-            <a:off x="1270000" y="6444160"/>
-            <a:ext cx="6553200" cy="396875"/>
+            <a:off x="382200" y="1567588"/>
+            <a:ext cx="8382000" cy="0"/>
           </a:xfrm>
-          <a:prstGeom prst="rect">
+          <a:prstGeom prst="line">
             <a:avLst/>
           </a:prstGeom>
           <a:noFill/>
-          <a:ln w="9525">
-            <a:noFill/>
-            <a:miter lim="800000"/>
+          <a:ln w="57150">
+            <a:solidFill>
+              <a:schemeClr val="bg1">
+                <a:lumMod val="65000"/>
+              </a:schemeClr>
+            </a:solidFill>
+            <a:round/>
             <a:headEnd/>
             <a:tailEnd/>
           </a:ln>
           <a:effectLst/>
         </p:spPr>
         <p:txBody>
-          <a:bodyPr>
-            <a:spAutoFit/>
+          <a:bodyPr wrap="none" lIns="91440" tIns="45720" rIns="91440" bIns="45720" anchor="ctr"/>
+          <a:lstStyle/>
+          <a:p>
+            <a:pPr algn="ctr" eaLnBrk="0" hangingPunct="0">
+              <a:spcBef>
+                <a:spcPct val="0"/>
+              </a:spcBef>
+              <a:defRPr/>
+            </a:pPr>
+            <a:endParaRPr lang="en-US" sz="1400" dirty="0">
+              <a:solidFill>
+                <a:srgbClr val="000000"/>
+              </a:solidFill>
+              <a:latin typeface="Arial" charset="0"/>
+            </a:endParaRPr>
+          </a:p>
+        </p:txBody>
+      </p:sp>
+      <p:sp>
+        <p:nvSpPr>
+          <p:cNvPr id="9" name="Rectangle 10"/>
+          <p:cNvSpPr>
+            <a:spLocks noGrp="1" noChangeArrowheads="1"/>
+          </p:cNvSpPr>
+          <p:nvPr>
+            <p:ph type="subTitle" idx="1"/>
+          </p:nvPr>
+        </p:nvSpPr>
+        <p:spPr>
+          <a:xfrm>
+            <a:off x="4159624" y="4743733"/>
+            <a:ext cx="4508500" cy="1489075"/>
+          </a:xfrm>
+        </p:spPr>
+        <p:txBody>
+          <a:bodyPr anchor="ctr">
+            <a:normAutofit lnSpcReduction="10000"/>
           </a:bodyPr>
-          <a:lstStyle/>
-          <a:p>
-            <a:pPr algn="ctr" fontAlgn="auto">
-              <a:spcAft>
-                <a:spcPts val="0"/>
-              </a:spcAft>
-            </a:pPr>
-            <a:r>
-              <a:rPr lang="en-US" sz="2000" b="1" i="1" dirty="0">
+          <a:lstStyle>
+            <a:lvl1pPr marL="0" indent="0" algn="r">
+              <a:buFont typeface="Wingdings" pitchFamily="2" charset="2"/>
+              <a:buNone/>
+              <a:defRPr/>
+            </a:lvl1pPr>
+          </a:lstStyle>
+          <a:p>
+            <a:r>
+              <a:rPr lang="en-US" dirty="0" smtClean="0"/>
+              <a:t>Maj Jeffrey </a:t>
+            </a:r>
+            <a:r>
+              <a:rPr lang="en-US" dirty="0"/>
+              <a:t>Falkinburg</a:t>
+            </a:r>
+            <a:br>
+              <a:rPr lang="en-US" dirty="0"/>
+            </a:br>
+            <a:r>
+              <a:rPr lang="en-US" dirty="0"/>
+              <a:t>Room 2E46E</a:t>
+            </a:r>
+            <a:br>
+              <a:rPr lang="en-US" dirty="0"/>
+            </a:br>
+            <a:r>
+              <a:rPr lang="en-US" dirty="0" smtClean="0"/>
+              <a:t>333-9193</a:t>
+            </a:r>
+          </a:p>
+        </p:txBody>
+      </p:sp>
+      <p:pic>
+        <p:nvPicPr>
+          <p:cNvPr id="1026" name="Picture 2" descr="https://sharepoint.usafa.edu/hq/CM/Shared%20Documents/Logo/USAFA%20Logo%20v%203%20line%20CMYK.png"/>
+          <p:cNvPicPr>
+            <a:picLocks noChangeAspect="1" noChangeArrowheads="1"/>
+          </p:cNvPicPr>
+          <p:nvPr/>
+        </p:nvPicPr>
+        <p:blipFill>
+          <a:blip r:embed="rId2" cstate="print">
+            <a:extLst>
+              <a:ext uri="{28A0092B-C50C-407E-A947-70E740481C1C}">
+                <a14:useLocalDpi xmlns:a14="http://schemas.microsoft.com/office/drawing/2010/main" val="0"/>
+              </a:ext>
+            </a:extLst>
+          </a:blip>
+          <a:srcRect/>
+          <a:stretch>
+            <a:fillRect/>
+          </a:stretch>
+        </p:blipFill>
+        <p:spPr bwMode="auto">
+          <a:xfrm>
+            <a:off x="480812" y="2281517"/>
+            <a:ext cx="2973096" cy="3389753"/>
+          </a:xfrm>
+          <a:prstGeom prst="rect">
+            <a:avLst/>
+          </a:prstGeom>
+          <a:noFill/>
+          <a:extLst>
+            <a:ext uri="{909E8E84-426E-40DD-AFC4-6F175D3DCCD1}">
+              <a14:hiddenFill xmlns:a14="http://schemas.microsoft.com/office/drawing/2010/main">
                 <a:solidFill>
-                  <a:prstClr val="black"/>
+                  <a:srgbClr val="FFFFFF"/>
                 </a:solidFill>
-                <a:latin typeface="Century Schoolbook" pitchFamily="18" charset="0"/>
-              </a:rPr>
-              <a:t>I n t e g r i t y  -  S e r v i c e  -  E x c e l </a:t>
-            </a:r>
-            <a:r>
-              <a:rPr lang="en-US" sz="2000" b="1" i="1" dirty="0" err="1">
-                <a:solidFill>
-                  <a:prstClr val="black"/>
-                </a:solidFill>
-                <a:latin typeface="Century Schoolbook" pitchFamily="18" charset="0"/>
-              </a:rPr>
-              <a:t>l</a:t>
-            </a:r>
-            <a:r>
-              <a:rPr lang="en-US" sz="2000" b="1" i="1" dirty="0">
-                <a:solidFill>
-                  <a:prstClr val="black"/>
-                </a:solidFill>
-                <a:latin typeface="Century Schoolbook" pitchFamily="18" charset="0"/>
-              </a:rPr>
-              <a:t> e n c e</a:t>
-            </a:r>
-          </a:p>
-        </p:txBody>
-      </p:sp>
+              </a14:hiddenFill>
+            </a:ext>
+          </a:extLst>
+        </p:spPr>
+      </p:pic>
     </p:spTree>
     <p:extLst>
       <p:ext uri="{BB962C8B-B14F-4D97-AF65-F5344CB8AC3E}">
-        <p14:creationId xmlns:p14="http://schemas.microsoft.com/office/powerpoint/2010/main" val="2545300548"/>
+        <p14:creationId xmlns:p14="http://schemas.microsoft.com/office/powerpoint/2010/main" val="4107146375"/>
       </p:ext>
     </p:extLst>
   </p:cSld>
   <p:clrMapOvr>
     <a:masterClrMapping/>
   </p:clrMapOvr>
+  <mc:AlternateContent xmlns:mc="http://schemas.openxmlformats.org/markup-compatibility/2006" xmlns:p14="http://schemas.microsoft.com/office/powerpoint/2010/main">
+    <mc:Choice Requires="p14">
+      <p:transition spd="slow" p14:dur="2000"/>
+    </mc:Choice>
+    <mc:Fallback xmlns="">
+      <p:transition spd="slow"/>
+    </mc:Fallback>
+  </mc:AlternateContent>
   <p:timing>
     <p:tnLst>
       <p:par>
@@ -9420,7 +9668,19 @@
             </a:r>
             <a:r>
               <a:rPr lang="en-US" b="0" dirty="0"/>
-              <a:t> (linked at top), needs to be paired with the AC'97 wrapper to produce the block diagram shown below.</a:t>
+              <a:t> (linked at top), needs to be paired with the </a:t>
+            </a:r>
+            <a:r>
+              <a:rPr lang="en-US" b="0" dirty="0" smtClean="0"/>
+              <a:t>Audio </a:t>
+            </a:r>
+            <a:r>
+              <a:rPr lang="en-US" b="0" smtClean="0"/>
+              <a:t>Codec Wrapper </a:t>
+            </a:r>
+            <a:r>
+              <a:rPr lang="en-US" b="0" dirty="0"/>
+              <a:t>to produce the block diagram shown below.</a:t>
             </a:r>
             <a:endParaRPr lang="en-US" b="0" dirty="0" smtClean="0"/>
           </a:p>

</xml_diff>

<commit_message>
Updating Lecture 26 filter demo image.
</commit_message>
<xml_diff>
--- a/lecture/slides/ECE_383_Lec26.pptx
+++ b/lecture/slides/ECE_383_Lec26.pptx
@@ -9730,7 +9730,7 @@
       </p:sp>
       <p:pic>
         <p:nvPicPr>
-          <p:cNvPr id="7170" name="Picture 2" descr="http://ece.ninja/383/lecture/img/lecture26-5.gif"/>
+          <p:cNvPr id="7170" name="Picture 2"/>
           <p:cNvPicPr>
             <a:picLocks noChangeAspect="1" noChangeArrowheads="1"/>
           </p:cNvPicPr>
@@ -9744,15 +9744,14 @@
               </a:ext>
             </a:extLst>
           </a:blip>
-          <a:srcRect/>
           <a:stretch>
             <a:fillRect/>
           </a:stretch>
         </p:blipFill>
         <p:spPr bwMode="auto">
           <a:xfrm>
-            <a:off x="674194" y="2658237"/>
-            <a:ext cx="7760124" cy="3762824"/>
+            <a:off x="674194" y="2658238"/>
+            <a:ext cx="7760124" cy="3762822"/>
           </a:xfrm>
           <a:prstGeom prst="rect">
             <a:avLst/>

</xml_diff>